<commit_message>
added talks and materials
</commit_message>
<xml_diff>
--- a/talks/long_term_data_storage.pptx
+++ b/talks/long_term_data_storage.pptx
@@ -11,9 +11,9 @@
     <p:sldId id="256" r:id="rId2"/>
     <p:sldId id="257" r:id="rId3"/>
     <p:sldId id="274" r:id="rId4"/>
-    <p:sldId id="258" r:id="rId5"/>
+    <p:sldId id="260" r:id="rId5"/>
     <p:sldId id="259" r:id="rId6"/>
-    <p:sldId id="260" r:id="rId7"/>
+    <p:sldId id="258" r:id="rId7"/>
     <p:sldId id="262" r:id="rId8"/>
     <p:sldId id="264" r:id="rId9"/>
     <p:sldId id="261" r:id="rId10"/>
@@ -1813,13 +1813,8 @@
           </a:pPr>
           <a:r>
             <a:rPr lang="en-US" dirty="0"/>
-            <a:t>Research outputs - publications, code, data, protocols, outreach materials, </a:t>
+            <a:t>Research outputs - publications, code, data, protocols, outreach materials, etcetera</a:t>
           </a:r>
-          <a:r>
-            <a:rPr lang="en-US" dirty="0" err="1"/>
-            <a:t>ecetera</a:t>
-          </a:r>
-          <a:endParaRPr lang="en-US" dirty="0"/>
         </a:p>
       </dgm:t>
     </dgm:pt>
@@ -1858,7 +1853,7 @@
             </a:lnSpc>
           </a:pPr>
           <a:r>
-            <a:rPr lang="en-US"/>
+            <a:rPr lang="en-US" dirty="0"/>
             <a:t>They cost: Time, effort, and resources</a:t>
           </a:r>
         </a:p>
@@ -2148,7 +2143,7 @@
           </a:pPr>
           <a:r>
             <a:rPr lang="en-US" dirty="0"/>
-            <a:t>Structural – how do items in your dataset fit together</a:t>
+            <a:t>Structural – how do items in your Dataset fit together</a:t>
           </a:r>
         </a:p>
       </dgm:t>
@@ -2505,13 +2500,8 @@
           </a:pPr>
           <a:r>
             <a:rPr lang="en-US" sz="2500" kern="1200" dirty="0"/>
-            <a:t>Research outputs - publications, code, data, protocols, outreach materials, </a:t>
+            <a:t>Research outputs - publications, code, data, protocols, outreach materials, etcetera</a:t>
           </a:r>
-          <a:r>
-            <a:rPr lang="en-US" sz="2500" kern="1200" dirty="0" err="1"/>
-            <a:t>ecetera</a:t>
-          </a:r>
-          <a:endParaRPr lang="en-US" sz="2500" kern="1200" dirty="0"/>
         </a:p>
       </dsp:txBody>
       <dsp:txXfrm>
@@ -2668,7 +2658,7 @@
             <a:buNone/>
           </a:pPr>
           <a:r>
-            <a:rPr lang="en-US" sz="2500" kern="1200"/>
+            <a:rPr lang="en-US" sz="2500" kern="1200" dirty="0"/>
             <a:t>They cost: Time, effort, and resources</a:t>
           </a:r>
         </a:p>
@@ -2996,7 +2986,7 @@
           </a:pPr>
           <a:r>
             <a:rPr lang="en-US" sz="2000" kern="1200" dirty="0"/>
-            <a:t>Structural – how do items in your dataset fit together</a:t>
+            <a:t>Structural – how do items in your Dataset fit together</a:t>
           </a:r>
         </a:p>
       </dsp:txBody>
@@ -5791,7 +5781,7 @@
             </a:lvl1pPr>
           </a:lstStyle>
           <a:p>
-            <a:endParaRPr lang="en-US"/>
+            <a:endParaRPr lang="en-US" dirty="0"/>
           </a:p>
         </p:txBody>
       </p:sp>
@@ -5826,7 +5816,7 @@
               <a:rPr lang="en-US" smtClean="0"/>
               <a:t>6/5/23</a:t>
             </a:fld>
-            <a:endParaRPr lang="en-US"/>
+            <a:endParaRPr lang="en-US" dirty="0"/>
           </a:p>
         </p:txBody>
       </p:sp>
@@ -5859,7 +5849,7 @@
           <a:bodyPr vert="horz" lIns="91440" tIns="45720" rIns="91440" bIns="45720" rtlCol="0" anchor="ctr"/>
           <a:lstStyle/>
           <a:p>
-            <a:endParaRPr lang="en-US"/>
+            <a:endParaRPr lang="en-US" dirty="0"/>
           </a:p>
         </p:txBody>
       </p:sp>
@@ -5949,7 +5939,7 @@
             </a:lvl1pPr>
           </a:lstStyle>
           <a:p>
-            <a:endParaRPr lang="en-US"/>
+            <a:endParaRPr lang="en-US" dirty="0"/>
           </a:p>
         </p:txBody>
       </p:sp>
@@ -5984,7 +5974,7 @@
               <a:rPr lang="en-US" smtClean="0"/>
               <a:t>‹#›</a:t>
             </a:fld>
-            <a:endParaRPr lang="en-US"/>
+            <a:endParaRPr lang="en-US" dirty="0"/>
           </a:p>
         </p:txBody>
       </p:sp>
@@ -6135,10 +6125,7 @@
           <a:bodyPr/>
           <a:lstStyle/>
           <a:p>
-            <a:r>
-              <a:rPr lang="en-US" dirty="0"/>
-              <a:t>They are not only valuable to the researchers who collected the data but also to broader scientific community. Entire fields of research have been created by the ability to re-use data.</a:t>
-            </a:r>
+            <a:endParaRPr lang="en-US" dirty="0"/>
           </a:p>
         </p:txBody>
       </p:sp>
@@ -6159,16 +6146,16 @@
           <a:p>
             <a:fld id="{465AF0FF-EACF-E44E-A814-689DA5D8CBF5}" type="slidenum">
               <a:rPr lang="en-US" smtClean="0"/>
-              <a:t>2</a:t>
+              <a:t>1</a:t>
             </a:fld>
-            <a:endParaRPr lang="en-US"/>
+            <a:endParaRPr lang="en-US" dirty="0"/>
           </a:p>
         </p:txBody>
       </p:sp>
     </p:spTree>
     <p:extLst>
       <p:ext uri="{BB962C8B-B14F-4D97-AF65-F5344CB8AC3E}">
-        <p14:creationId xmlns:p14="http://schemas.microsoft.com/office/powerpoint/2010/main" val="556543068"/>
+        <p14:creationId xmlns:p14="http://schemas.microsoft.com/office/powerpoint/2010/main" val="1264890907"/>
       </p:ext>
     </p:extLst>
   </p:cSld>
@@ -6222,22 +6209,7 @@
           <a:bodyPr/>
           <a:lstStyle/>
           <a:p>
-            <a:r>
-              <a:rPr lang="en-US" dirty="0"/>
-              <a:t> - structural vs descriptive metadata</a:t>
-            </a:r>
-          </a:p>
-          <a:p>
-            <a:r>
-              <a:rPr lang="en-US" dirty="0"/>
-              <a:t>   - linking items in metadata </a:t>
-            </a:r>
-          </a:p>
-          <a:p>
-            <a:r>
-              <a:rPr lang="en-US" dirty="0"/>
-              <a:t>   - importance of permanent IDs</a:t>
-            </a:r>
+            <a:endParaRPr lang="en-US" dirty="0"/>
           </a:p>
         </p:txBody>
       </p:sp>
@@ -6258,16 +6230,16 @@
           <a:p>
             <a:fld id="{465AF0FF-EACF-E44E-A814-689DA5D8CBF5}" type="slidenum">
               <a:rPr lang="en-US" smtClean="0"/>
-              <a:t>12</a:t>
+              <a:t>10</a:t>
             </a:fld>
-            <a:endParaRPr lang="en-US"/>
+            <a:endParaRPr lang="en-US" dirty="0"/>
           </a:p>
         </p:txBody>
       </p:sp>
     </p:spTree>
     <p:extLst>
       <p:ext uri="{BB962C8B-B14F-4D97-AF65-F5344CB8AC3E}">
-        <p14:creationId xmlns:p14="http://schemas.microsoft.com/office/powerpoint/2010/main" val="2905572910"/>
+        <p14:creationId xmlns:p14="http://schemas.microsoft.com/office/powerpoint/2010/main" val="805213592"/>
       </p:ext>
     </p:extLst>
   </p:cSld>
@@ -6321,6 +6293,15 @@
           <a:bodyPr/>
           <a:lstStyle/>
           <a:p>
+            <a:r>
+              <a:rPr lang="en-US" dirty="0"/>
+              <a:t>Next will talk about metadata. All of your research outputs will need metadata in order to be deposited</a:t>
+            </a:r>
+          </a:p>
+          <a:p>
+            <a:endParaRPr lang="en-US" dirty="0"/>
+          </a:p>
+          <a:p>
             <a:pPr marL="0" marR="0" lvl="0" indent="0" algn="l" defTabSz="914400" rtl="0" eaLnBrk="1" fontAlgn="auto" latinLnBrk="0" hangingPunct="1">
               <a:lnSpc>
                 <a:spcPct val="100000"/>
@@ -6340,11 +6321,17 @@
             </a:pPr>
             <a:r>
               <a:rPr lang="en-US" dirty="0"/>
-              <a:t>not yet (5/30/2023) implemented in deposits but will be in the near future – check in on this before the talk</a:t>
+              <a:t>As I said earlier, Metadata is allows researchers to discover outputs and to link outputs, people, and institutions.</a:t>
             </a:r>
           </a:p>
           <a:p>
             <a:endParaRPr lang="en-US" dirty="0"/>
+          </a:p>
+          <a:p>
+            <a:r>
+              <a:rPr lang="en-US" dirty="0"/>
+              <a:t>In general, there are two types</a:t>
+            </a:r>
           </a:p>
         </p:txBody>
       </p:sp>
@@ -6365,16 +6352,16 @@
           <a:p>
             <a:fld id="{465AF0FF-EACF-E44E-A814-689DA5D8CBF5}" type="slidenum">
               <a:rPr lang="en-US" smtClean="0"/>
-              <a:t>14</a:t>
+              <a:t>11</a:t>
             </a:fld>
-            <a:endParaRPr lang="en-US"/>
+            <a:endParaRPr lang="en-US" dirty="0"/>
           </a:p>
         </p:txBody>
       </p:sp>
     </p:spTree>
     <p:extLst>
       <p:ext uri="{BB962C8B-B14F-4D97-AF65-F5344CB8AC3E}">
-        <p14:creationId xmlns:p14="http://schemas.microsoft.com/office/powerpoint/2010/main" val="4223571995"/>
+        <p14:creationId xmlns:p14="http://schemas.microsoft.com/office/powerpoint/2010/main" val="2553274909"/>
       </p:ext>
     </p:extLst>
   </p:cSld>
@@ -6428,26 +6415,9 @@
           <a:bodyPr/>
           <a:lstStyle/>
           <a:p>
-            <a:pPr marL="0" marR="0" lvl="0" indent="0" algn="l" defTabSz="914400" rtl="0" eaLnBrk="1" fontAlgn="auto" latinLnBrk="0" hangingPunct="1">
-              <a:lnSpc>
-                <a:spcPct val="100000"/>
-              </a:lnSpc>
-              <a:spcBef>
-                <a:spcPts val="0"/>
-              </a:spcBef>
-              <a:spcAft>
-                <a:spcPts val="0"/>
-              </a:spcAft>
-              <a:buClrTx/>
-              <a:buSzTx/>
-              <a:buFontTx/>
-              <a:buNone/>
-              <a:tabLst/>
-              <a:defRPr/>
-            </a:pPr>
             <a:r>
               <a:rPr lang="en-US" dirty="0"/>
-              <a:t>Not every dataset can be </a:t>
+              <a:t>- From the perspective of the repository, descriptive metadata usually more important  </a:t>
             </a:r>
           </a:p>
           <a:p>
@@ -6472,16 +6442,16 @@
           <a:p>
             <a:fld id="{465AF0FF-EACF-E44E-A814-689DA5D8CBF5}" type="slidenum">
               <a:rPr lang="en-US" smtClean="0"/>
-              <a:t>15</a:t>
+              <a:t>12</a:t>
             </a:fld>
-            <a:endParaRPr lang="en-US"/>
+            <a:endParaRPr lang="en-US" dirty="0"/>
           </a:p>
         </p:txBody>
       </p:sp>
     </p:spTree>
     <p:extLst>
       <p:ext uri="{BB962C8B-B14F-4D97-AF65-F5344CB8AC3E}">
-        <p14:creationId xmlns:p14="http://schemas.microsoft.com/office/powerpoint/2010/main" val="3357550272"/>
+        <p14:creationId xmlns:p14="http://schemas.microsoft.com/office/powerpoint/2010/main" val="2905572910"/>
       </p:ext>
     </p:extLst>
   </p:cSld>
@@ -6556,16 +6526,16 @@
           <a:p>
             <a:fld id="{465AF0FF-EACF-E44E-A814-689DA5D8CBF5}" type="slidenum">
               <a:rPr lang="en-US" smtClean="0"/>
-              <a:t>16</a:t>
+              <a:t>13</a:t>
             </a:fld>
-            <a:endParaRPr lang="en-US"/>
+            <a:endParaRPr lang="en-US" dirty="0"/>
           </a:p>
         </p:txBody>
       </p:sp>
     </p:spTree>
     <p:extLst>
       <p:ext uri="{BB962C8B-B14F-4D97-AF65-F5344CB8AC3E}">
-        <p14:creationId xmlns:p14="http://schemas.microsoft.com/office/powerpoint/2010/main" val="3613656959"/>
+        <p14:creationId xmlns:p14="http://schemas.microsoft.com/office/powerpoint/2010/main" val="115462129"/>
       </p:ext>
     </p:extLst>
   </p:cSld>
@@ -6619,7 +6589,10 @@
           <a:bodyPr/>
           <a:lstStyle/>
           <a:p>
-            <a:endParaRPr lang="en-US" dirty="0"/>
+            <a:r>
+              <a:rPr lang="en-US" dirty="0"/>
+              <a:t>What happens if something changes? Most repositories allow for versioning. </a:t>
+            </a:r>
           </a:p>
         </p:txBody>
       </p:sp>
@@ -6640,16 +6613,16 @@
           <a:p>
             <a:fld id="{465AF0FF-EACF-E44E-A814-689DA5D8CBF5}" type="slidenum">
               <a:rPr lang="en-US" smtClean="0"/>
-              <a:t>17</a:t>
+              <a:t>14</a:t>
             </a:fld>
-            <a:endParaRPr lang="en-US"/>
+            <a:endParaRPr lang="en-US" dirty="0"/>
           </a:p>
         </p:txBody>
       </p:sp>
     </p:spTree>
     <p:extLst>
       <p:ext uri="{BB962C8B-B14F-4D97-AF65-F5344CB8AC3E}">
-        <p14:creationId xmlns:p14="http://schemas.microsoft.com/office/powerpoint/2010/main" val="235091920"/>
+        <p14:creationId xmlns:p14="http://schemas.microsoft.com/office/powerpoint/2010/main" val="4223571995"/>
       </p:ext>
     </p:extLst>
   </p:cSld>
@@ -6703,6 +6676,29 @@
           <a:bodyPr/>
           <a:lstStyle/>
           <a:p>
+            <a:pPr marL="0" marR="0" lvl="0" indent="0" algn="l" defTabSz="914400" rtl="0" eaLnBrk="1" fontAlgn="auto" latinLnBrk="0" hangingPunct="1">
+              <a:lnSpc>
+                <a:spcPct val="100000"/>
+              </a:lnSpc>
+              <a:spcBef>
+                <a:spcPts val="0"/>
+              </a:spcBef>
+              <a:spcAft>
+                <a:spcPts val="0"/>
+              </a:spcAft>
+              <a:buClrTx/>
+              <a:buSzTx/>
+              <a:buFontTx/>
+              <a:buNone/>
+              <a:tabLst/>
+              <a:defRPr/>
+            </a:pPr>
+            <a:r>
+              <a:rPr lang="en-US" dirty="0"/>
+              <a:t>Not every dataset can be </a:t>
+            </a:r>
+          </a:p>
+          <a:p>
             <a:endParaRPr lang="en-US" dirty="0"/>
           </a:p>
         </p:txBody>
@@ -6724,16 +6720,16 @@
           <a:p>
             <a:fld id="{465AF0FF-EACF-E44E-A814-689DA5D8CBF5}" type="slidenum">
               <a:rPr lang="en-US" smtClean="0"/>
-              <a:t>18</a:t>
+              <a:t>15</a:t>
             </a:fld>
-            <a:endParaRPr lang="en-US"/>
+            <a:endParaRPr lang="en-US" dirty="0"/>
           </a:p>
         </p:txBody>
       </p:sp>
     </p:spTree>
     <p:extLst>
       <p:ext uri="{BB962C8B-B14F-4D97-AF65-F5344CB8AC3E}">
-        <p14:creationId xmlns:p14="http://schemas.microsoft.com/office/powerpoint/2010/main" val="2866962163"/>
+        <p14:creationId xmlns:p14="http://schemas.microsoft.com/office/powerpoint/2010/main" val="3357550272"/>
       </p:ext>
     </p:extLst>
   </p:cSld>
@@ -6808,9 +6804,272 @@
           <a:p>
             <a:fld id="{465AF0FF-EACF-E44E-A814-689DA5D8CBF5}" type="slidenum">
               <a:rPr lang="en-US" smtClean="0"/>
+              <a:t>16</a:t>
+            </a:fld>
+            <a:endParaRPr lang="en-US" dirty="0"/>
+          </a:p>
+        </p:txBody>
+      </p:sp>
+    </p:spTree>
+    <p:extLst>
+      <p:ext uri="{BB962C8B-B14F-4D97-AF65-F5344CB8AC3E}">
+        <p14:creationId xmlns:p14="http://schemas.microsoft.com/office/powerpoint/2010/main" val="3613656959"/>
+      </p:ext>
+    </p:extLst>
+  </p:cSld>
+  <p:clrMapOvr>
+    <a:masterClrMapping/>
+  </p:clrMapOvr>
+</p:notes>
+</file>
+
+<file path=ppt/notesSlides/notesSlide17.xml><?xml version="1.0" encoding="utf-8"?>
+<p:notes xmlns:a="http://schemas.openxmlformats.org/drawingml/2006/main" xmlns:r="http://schemas.openxmlformats.org/officeDocument/2006/relationships" xmlns:p="http://schemas.openxmlformats.org/presentationml/2006/main">
+  <p:cSld>
+    <p:spTree>
+      <p:nvGrpSpPr>
+        <p:cNvPr id="1" name=""/>
+        <p:cNvGrpSpPr/>
+        <p:nvPr/>
+      </p:nvGrpSpPr>
+      <p:grpSpPr>
+        <a:xfrm>
+          <a:off x="0" y="0"/>
+          <a:ext cx="0" cy="0"/>
+          <a:chOff x="0" y="0"/>
+          <a:chExt cx="0" cy="0"/>
+        </a:xfrm>
+      </p:grpSpPr>
+      <p:sp>
+        <p:nvSpPr>
+          <p:cNvPr id="2" name="Slide Image Placeholder 1"/>
+          <p:cNvSpPr>
+            <a:spLocks noGrp="1" noRot="1" noChangeAspect="1"/>
+          </p:cNvSpPr>
+          <p:nvPr>
+            <p:ph type="sldImg"/>
+          </p:nvPr>
+        </p:nvSpPr>
+        <p:spPr/>
+      </p:sp>
+      <p:sp>
+        <p:nvSpPr>
+          <p:cNvPr id="3" name="Notes Placeholder 2"/>
+          <p:cNvSpPr>
+            <a:spLocks noGrp="1"/>
+          </p:cNvSpPr>
+          <p:nvPr>
+            <p:ph type="body" idx="1"/>
+          </p:nvPr>
+        </p:nvSpPr>
+        <p:spPr/>
+        <p:txBody>
+          <a:bodyPr/>
+          <a:lstStyle/>
+          <a:p>
+            <a:endParaRPr lang="en-US" dirty="0"/>
+          </a:p>
+        </p:txBody>
+      </p:sp>
+      <p:sp>
+        <p:nvSpPr>
+          <p:cNvPr id="4" name="Slide Number Placeholder 3"/>
+          <p:cNvSpPr>
+            <a:spLocks noGrp="1"/>
+          </p:cNvSpPr>
+          <p:nvPr>
+            <p:ph type="sldNum" sz="quarter" idx="5"/>
+          </p:nvPr>
+        </p:nvSpPr>
+        <p:spPr/>
+        <p:txBody>
+          <a:bodyPr/>
+          <a:lstStyle/>
+          <a:p>
+            <a:fld id="{465AF0FF-EACF-E44E-A814-689DA5D8CBF5}" type="slidenum">
+              <a:rPr lang="en-US" smtClean="0"/>
+              <a:t>17</a:t>
+            </a:fld>
+            <a:endParaRPr lang="en-US" dirty="0"/>
+          </a:p>
+        </p:txBody>
+      </p:sp>
+    </p:spTree>
+    <p:extLst>
+      <p:ext uri="{BB962C8B-B14F-4D97-AF65-F5344CB8AC3E}">
+        <p14:creationId xmlns:p14="http://schemas.microsoft.com/office/powerpoint/2010/main" val="235091920"/>
+      </p:ext>
+    </p:extLst>
+  </p:cSld>
+  <p:clrMapOvr>
+    <a:masterClrMapping/>
+  </p:clrMapOvr>
+</p:notes>
+</file>
+
+<file path=ppt/notesSlides/notesSlide18.xml><?xml version="1.0" encoding="utf-8"?>
+<p:notes xmlns:a="http://schemas.openxmlformats.org/drawingml/2006/main" xmlns:r="http://schemas.openxmlformats.org/officeDocument/2006/relationships" xmlns:p="http://schemas.openxmlformats.org/presentationml/2006/main">
+  <p:cSld>
+    <p:spTree>
+      <p:nvGrpSpPr>
+        <p:cNvPr id="1" name=""/>
+        <p:cNvGrpSpPr/>
+        <p:nvPr/>
+      </p:nvGrpSpPr>
+      <p:grpSpPr>
+        <a:xfrm>
+          <a:off x="0" y="0"/>
+          <a:ext cx="0" cy="0"/>
+          <a:chOff x="0" y="0"/>
+          <a:chExt cx="0" cy="0"/>
+        </a:xfrm>
+      </p:grpSpPr>
+      <p:sp>
+        <p:nvSpPr>
+          <p:cNvPr id="2" name="Slide Image Placeholder 1"/>
+          <p:cNvSpPr>
+            <a:spLocks noGrp="1" noRot="1" noChangeAspect="1"/>
+          </p:cNvSpPr>
+          <p:nvPr>
+            <p:ph type="sldImg"/>
+          </p:nvPr>
+        </p:nvSpPr>
+        <p:spPr/>
+      </p:sp>
+      <p:sp>
+        <p:nvSpPr>
+          <p:cNvPr id="3" name="Notes Placeholder 2"/>
+          <p:cNvSpPr>
+            <a:spLocks noGrp="1"/>
+          </p:cNvSpPr>
+          <p:nvPr>
+            <p:ph type="body" idx="1"/>
+          </p:nvPr>
+        </p:nvSpPr>
+        <p:spPr/>
+        <p:txBody>
+          <a:bodyPr/>
+          <a:lstStyle/>
+          <a:p>
+            <a:r>
+              <a:rPr lang="en-US" dirty="0"/>
+              <a:t>At EHA we generally recommend using </a:t>
+            </a:r>
+            <a:r>
+              <a:rPr lang="en-US" dirty="0" err="1"/>
+              <a:t>zenodo</a:t>
+            </a:r>
+            <a:r>
+              <a:rPr lang="en-US" dirty="0"/>
+              <a:t> if you don't have specialist repository. </a:t>
+            </a:r>
+          </a:p>
+        </p:txBody>
+      </p:sp>
+      <p:sp>
+        <p:nvSpPr>
+          <p:cNvPr id="4" name="Slide Number Placeholder 3"/>
+          <p:cNvSpPr>
+            <a:spLocks noGrp="1"/>
+          </p:cNvSpPr>
+          <p:nvPr>
+            <p:ph type="sldNum" sz="quarter" idx="5"/>
+          </p:nvPr>
+        </p:nvSpPr>
+        <p:spPr/>
+        <p:txBody>
+          <a:bodyPr/>
+          <a:lstStyle/>
+          <a:p>
+            <a:fld id="{465AF0FF-EACF-E44E-A814-689DA5D8CBF5}" type="slidenum">
+              <a:rPr lang="en-US" smtClean="0"/>
+              <a:t>18</a:t>
+            </a:fld>
+            <a:endParaRPr lang="en-US" dirty="0"/>
+          </a:p>
+        </p:txBody>
+      </p:sp>
+    </p:spTree>
+    <p:extLst>
+      <p:ext uri="{BB962C8B-B14F-4D97-AF65-F5344CB8AC3E}">
+        <p14:creationId xmlns:p14="http://schemas.microsoft.com/office/powerpoint/2010/main" val="2866962163"/>
+      </p:ext>
+    </p:extLst>
+  </p:cSld>
+  <p:clrMapOvr>
+    <a:masterClrMapping/>
+  </p:clrMapOvr>
+</p:notes>
+</file>
+
+<file path=ppt/notesSlides/notesSlide19.xml><?xml version="1.0" encoding="utf-8"?>
+<p:notes xmlns:a="http://schemas.openxmlformats.org/drawingml/2006/main" xmlns:r="http://schemas.openxmlformats.org/officeDocument/2006/relationships" xmlns:p="http://schemas.openxmlformats.org/presentationml/2006/main">
+  <p:cSld>
+    <p:spTree>
+      <p:nvGrpSpPr>
+        <p:cNvPr id="1" name=""/>
+        <p:cNvGrpSpPr/>
+        <p:nvPr/>
+      </p:nvGrpSpPr>
+      <p:grpSpPr>
+        <a:xfrm>
+          <a:off x="0" y="0"/>
+          <a:ext cx="0" cy="0"/>
+          <a:chOff x="0" y="0"/>
+          <a:chExt cx="0" cy="0"/>
+        </a:xfrm>
+      </p:grpSpPr>
+      <p:sp>
+        <p:nvSpPr>
+          <p:cNvPr id="2" name="Slide Image Placeholder 1"/>
+          <p:cNvSpPr>
+            <a:spLocks noGrp="1" noRot="1" noChangeAspect="1"/>
+          </p:cNvSpPr>
+          <p:nvPr>
+            <p:ph type="sldImg"/>
+          </p:nvPr>
+        </p:nvSpPr>
+        <p:spPr/>
+      </p:sp>
+      <p:sp>
+        <p:nvSpPr>
+          <p:cNvPr id="3" name="Notes Placeholder 2"/>
+          <p:cNvSpPr>
+            <a:spLocks noGrp="1"/>
+          </p:cNvSpPr>
+          <p:nvPr>
+            <p:ph type="body" idx="1"/>
+          </p:nvPr>
+        </p:nvSpPr>
+        <p:spPr/>
+        <p:txBody>
+          <a:bodyPr/>
+          <a:lstStyle/>
+          <a:p>
+            <a:endParaRPr lang="en-US" dirty="0"/>
+          </a:p>
+        </p:txBody>
+      </p:sp>
+      <p:sp>
+        <p:nvSpPr>
+          <p:cNvPr id="4" name="Slide Number Placeholder 3"/>
+          <p:cNvSpPr>
+            <a:spLocks noGrp="1"/>
+          </p:cNvSpPr>
+          <p:nvPr>
+            <p:ph type="sldNum" sz="quarter" idx="5"/>
+          </p:nvPr>
+        </p:nvSpPr>
+        <p:spPr/>
+        <p:txBody>
+          <a:bodyPr/>
+          <a:lstStyle/>
+          <a:p>
+            <a:fld id="{465AF0FF-EACF-E44E-A814-689DA5D8CBF5}" type="slidenum">
+              <a:rPr lang="en-US" smtClean="0"/>
               <a:t>19</a:t>
             </a:fld>
-            <a:endParaRPr lang="en-US"/>
+            <a:endParaRPr lang="en-US" dirty="0"/>
           </a:p>
         </p:txBody>
       </p:sp>
@@ -6871,83 +7130,9 @@
           <a:bodyPr/>
           <a:lstStyle/>
           <a:p>
-            <a:pPr algn="l">
-              <a:buFont typeface="Arial" panose="020B0604020202020204" pitchFamily="34" charset="0"/>
-              <a:buChar char="•"/>
-            </a:pPr>
-            <a:r>
-              <a:rPr lang="en-US" b="0" i="0" dirty="0">
-                <a:solidFill>
-                  <a:srgbClr val="000000"/>
-                </a:solidFill>
-                <a:effectLst/>
-                <a:latin typeface="Avenir" panose="02000503020000020003" pitchFamily="2" charset="0"/>
-              </a:rPr>
-              <a:t>Our ability to access data decays over time.</a:t>
-            </a:r>
-          </a:p>
-          <a:p>
-            <a:pPr algn="l">
-              <a:buFont typeface="Arial" panose="020B0604020202020204" pitchFamily="34" charset="0"/>
-              <a:buChar char="•"/>
-            </a:pPr>
-            <a:r>
-              <a:rPr lang="en-US" b="0" i="0" dirty="0">
-                <a:solidFill>
-                  <a:srgbClr val="000000"/>
-                </a:solidFill>
-                <a:effectLst/>
-                <a:latin typeface="Avenir" panose="02000503020000020003" pitchFamily="2" charset="0"/>
-              </a:rPr>
-              <a:t>A 2013 study looking at data access for 516 articles published over a 20 year period and found that the odds of an author retrieving the data related to their published paper dropped by 17% per year.</a:t>
-            </a:r>
-          </a:p>
-          <a:p>
-            <a:pPr algn="l">
-              <a:buFont typeface="Arial" panose="020B0604020202020204" pitchFamily="34" charset="0"/>
-              <a:buChar char="•"/>
-            </a:pPr>
-            <a:r>
-              <a:rPr lang="en-US" b="0" i="0" dirty="0">
-                <a:solidFill>
-                  <a:srgbClr val="000000"/>
-                </a:solidFill>
-                <a:effectLst/>
-                <a:latin typeface="Avenir" panose="02000503020000020003" pitchFamily="2" charset="0"/>
-              </a:rPr>
-              <a:t>Interestingly, there was no relationship between time and response rate. So authors of older and newer papers were just as likely to respond.</a:t>
-            </a:r>
-          </a:p>
-          <a:p>
-            <a:pPr algn="l">
-              <a:buFont typeface="Arial" panose="020B0604020202020204" pitchFamily="34" charset="0"/>
-              <a:buChar char="•"/>
-            </a:pPr>
-            <a:r>
-              <a:rPr lang="en-US" b="0" i="0" dirty="0">
-                <a:solidFill>
-                  <a:srgbClr val="000000"/>
-                </a:solidFill>
-                <a:effectLst/>
-                <a:latin typeface="Avenir" panose="02000503020000020003" pitchFamily="2" charset="0"/>
-              </a:rPr>
-              <a:t>The study authors concluded that individual researchers should not be responsible for managing their data long term</a:t>
-            </a:r>
-          </a:p>
-          <a:p>
-            <a:pPr algn="l">
-              <a:buFont typeface="Arial" panose="020B0604020202020204" pitchFamily="34" charset="0"/>
-              <a:buChar char="•"/>
-            </a:pPr>
-            <a:r>
-              <a:rPr lang="en-US" b="0" i="0" dirty="0">
-                <a:solidFill>
-                  <a:srgbClr val="000000"/>
-                </a:solidFill>
-                <a:effectLst/>
-                <a:latin typeface="Avenir" panose="02000503020000020003" pitchFamily="2" charset="0"/>
-              </a:rPr>
-              <a:t>To be good long term data stewards, we use data Management Plan and will put our research outputs into data repositories.</a:t>
+            <a:r>
+              <a:rPr lang="en-US" dirty="0"/>
+              <a:t>They are not only valuable to the researchers who collected the data but also to broader scientific community.</a:t>
             </a:r>
           </a:p>
         </p:txBody>
@@ -6969,16 +7154,16 @@
           <a:p>
             <a:fld id="{465AF0FF-EACF-E44E-A814-689DA5D8CBF5}" type="slidenum">
               <a:rPr lang="en-US" smtClean="0"/>
-              <a:t>3</a:t>
+              <a:t>2</a:t>
             </a:fld>
-            <a:endParaRPr lang="en-US"/>
+            <a:endParaRPr lang="en-US" dirty="0"/>
           </a:p>
         </p:txBody>
       </p:sp>
     </p:spTree>
     <p:extLst>
       <p:ext uri="{BB962C8B-B14F-4D97-AF65-F5344CB8AC3E}">
-        <p14:creationId xmlns:p14="http://schemas.microsoft.com/office/powerpoint/2010/main" val="3277683257"/>
+        <p14:creationId xmlns:p14="http://schemas.microsoft.com/office/powerpoint/2010/main" val="556543068"/>
       </p:ext>
     </p:extLst>
   </p:cSld>
@@ -7032,16 +7217,84 @@
           <a:bodyPr/>
           <a:lstStyle/>
           <a:p>
-            <a:r>
-              <a:rPr lang="en-US" dirty="0"/>
-              <a:t>To make this notion more concrete – lets think back to  the discussion on climate change research we had several weeks ago. During that discussion we were looking for examples of EHA’s climate related work that could be expanded by looking a them through the lens of climate change. </a:t>
-            </a:r>
-          </a:p>
-          <a:p>
-            <a:endParaRPr lang="en-US" dirty="0"/>
-          </a:p>
-          <a:p>
-            <a:endParaRPr lang="en-US" dirty="0"/>
+            <a:pPr algn="l">
+              <a:buFont typeface="Arial" panose="020B0604020202020204" pitchFamily="34" charset="0"/>
+              <a:buChar char="•"/>
+            </a:pPr>
+            <a:r>
+              <a:rPr lang="en-US" b="0" i="0" dirty="0">
+                <a:solidFill>
+                  <a:srgbClr val="000000"/>
+                </a:solidFill>
+                <a:effectLst/>
+                <a:latin typeface="Avenir" panose="02000503020000020003" pitchFamily="2" charset="0"/>
+              </a:rPr>
+              <a:t>Our ability to access data decays over time.</a:t>
+            </a:r>
+          </a:p>
+          <a:p>
+            <a:pPr algn="l">
+              <a:buFont typeface="Arial" panose="020B0604020202020204" pitchFamily="34" charset="0"/>
+              <a:buChar char="•"/>
+            </a:pPr>
+            <a:r>
+              <a:rPr lang="en-US" b="0" i="0" dirty="0">
+                <a:solidFill>
+                  <a:srgbClr val="000000"/>
+                </a:solidFill>
+                <a:effectLst/>
+                <a:latin typeface="Avenir" panose="02000503020000020003" pitchFamily="2" charset="0"/>
+              </a:rPr>
+              <a:t>A 2013 study looking at data access for 516 articles published over a 20 year period and found that the odds of an author retrieving the data related to their published paper dropped by 17% per year.</a:t>
+            </a:r>
+          </a:p>
+          <a:p>
+            <a:pPr algn="l">
+              <a:buFont typeface="Arial" panose="020B0604020202020204" pitchFamily="34" charset="0"/>
+              <a:buChar char="•"/>
+            </a:pPr>
+            <a:r>
+              <a:rPr lang="en-US" b="0" i="0" dirty="0">
+                <a:solidFill>
+                  <a:srgbClr val="000000"/>
+                </a:solidFill>
+                <a:effectLst/>
+                <a:latin typeface="Avenir" panose="02000503020000020003" pitchFamily="2" charset="0"/>
+              </a:rPr>
+              <a:t>Interestingly, response rate did not decay, authors of older and newer papers were just as likely to respond.</a:t>
+            </a:r>
+          </a:p>
+          <a:p>
+            <a:pPr algn="l">
+              <a:buFont typeface="Arial" panose="020B0604020202020204" pitchFamily="34" charset="0"/>
+              <a:buChar char="•"/>
+            </a:pPr>
+            <a:r>
+              <a:rPr lang="en-US" b="0" i="0" dirty="0">
+                <a:solidFill>
+                  <a:srgbClr val="000000"/>
+                </a:solidFill>
+                <a:effectLst/>
+                <a:latin typeface="Avenir" panose="02000503020000020003" pitchFamily="2" charset="0"/>
+              </a:rPr>
+              <a:t>The study authors concluded that individual researchers should not be responsible for managing their data long term</a:t>
+            </a:r>
+          </a:p>
+          <a:p>
+            <a:pPr algn="l">
+              <a:buFont typeface="Arial" panose="020B0604020202020204" pitchFamily="34" charset="0"/>
+              <a:buChar char="•"/>
+            </a:pPr>
+            <a:r>
+              <a:rPr lang="en-US" b="0" i="0" dirty="0">
+                <a:solidFill>
+                  <a:srgbClr val="000000"/>
+                </a:solidFill>
+                <a:effectLst/>
+                <a:latin typeface="Avenir" panose="02000503020000020003" pitchFamily="2" charset="0"/>
+              </a:rPr>
+              <a:t>To be good long term data stewards, we use data Management Plan and will put our research outputs into repositories.</a:t>
+            </a:r>
           </a:p>
         </p:txBody>
       </p:sp>
@@ -7062,16 +7315,16 @@
           <a:p>
             <a:fld id="{465AF0FF-EACF-E44E-A814-689DA5D8CBF5}" type="slidenum">
               <a:rPr lang="en-US" smtClean="0"/>
-              <a:t>4</a:t>
+              <a:t>3</a:t>
             </a:fld>
-            <a:endParaRPr lang="en-US"/>
+            <a:endParaRPr lang="en-US" dirty="0"/>
           </a:p>
         </p:txBody>
       </p:sp>
     </p:spTree>
     <p:extLst>
       <p:ext uri="{BB962C8B-B14F-4D97-AF65-F5344CB8AC3E}">
-        <p14:creationId xmlns:p14="http://schemas.microsoft.com/office/powerpoint/2010/main" val="3604445559"/>
+        <p14:creationId xmlns:p14="http://schemas.microsoft.com/office/powerpoint/2010/main" val="3277683257"/>
       </p:ext>
     </p:extLst>
   </p:cSld>
@@ -7125,7 +7378,10 @@
           <a:bodyPr/>
           <a:lstStyle/>
           <a:p>
-            <a:endParaRPr lang="en-US" dirty="0"/>
+            <a:r>
+              <a:rPr lang="en-US" dirty="0"/>
+              <a:t> Entire fields of research have been created by the ability to re-use data.</a:t>
+            </a:r>
           </a:p>
         </p:txBody>
       </p:sp>
@@ -7146,16 +7402,16 @@
           <a:p>
             <a:fld id="{465AF0FF-EACF-E44E-A814-689DA5D8CBF5}" type="slidenum">
               <a:rPr lang="en-US" smtClean="0"/>
-              <a:t>5</a:t>
+              <a:t>4</a:t>
             </a:fld>
-            <a:endParaRPr lang="en-US"/>
+            <a:endParaRPr lang="en-US" dirty="0"/>
           </a:p>
         </p:txBody>
       </p:sp>
     </p:spTree>
     <p:extLst>
       <p:ext uri="{BB962C8B-B14F-4D97-AF65-F5344CB8AC3E}">
-        <p14:creationId xmlns:p14="http://schemas.microsoft.com/office/powerpoint/2010/main" val="4017018826"/>
+        <p14:creationId xmlns:p14="http://schemas.microsoft.com/office/powerpoint/2010/main" val="2097285125"/>
       </p:ext>
     </p:extLst>
   </p:cSld>
@@ -7209,6 +7465,20 @@
           <a:bodyPr/>
           <a:lstStyle/>
           <a:p>
+            <a:pPr lvl="0"/>
+            <a:r>
+              <a:rPr lang="en-US" dirty="0"/>
+              <a:t>You will likely be complying with funding requirements</a:t>
+            </a:r>
+          </a:p>
+          <a:p>
+            <a:pPr lvl="0"/>
+            <a:r>
+              <a:rPr lang="en-US" dirty="0"/>
+              <a:t>Easier for you to reuse work to get funding</a:t>
+            </a:r>
+          </a:p>
+          <a:p>
             <a:endParaRPr lang="en-US" dirty="0"/>
           </a:p>
         </p:txBody>
@@ -7230,16 +7500,16 @@
           <a:p>
             <a:fld id="{465AF0FF-EACF-E44E-A814-689DA5D8CBF5}" type="slidenum">
               <a:rPr lang="en-US" smtClean="0"/>
-              <a:t>7</a:t>
+              <a:t>5</a:t>
             </a:fld>
-            <a:endParaRPr lang="en-US"/>
+            <a:endParaRPr lang="en-US" dirty="0"/>
           </a:p>
         </p:txBody>
       </p:sp>
     </p:spTree>
     <p:extLst>
       <p:ext uri="{BB962C8B-B14F-4D97-AF65-F5344CB8AC3E}">
-        <p14:creationId xmlns:p14="http://schemas.microsoft.com/office/powerpoint/2010/main" val="2845366223"/>
+        <p14:creationId xmlns:p14="http://schemas.microsoft.com/office/powerpoint/2010/main" val="4017018826"/>
       </p:ext>
     </p:extLst>
   </p:cSld>
@@ -7293,27 +7563,13 @@
           <a:bodyPr/>
           <a:lstStyle/>
           <a:p>
-            <a:pPr marL="0" marR="0" lvl="0" indent="0" algn="l" defTabSz="914400" rtl="0" eaLnBrk="1" fontAlgn="auto" latinLnBrk="0" hangingPunct="1">
-              <a:lnSpc>
-                <a:spcPct val="100000"/>
-              </a:lnSpc>
-              <a:spcBef>
-                <a:spcPts val="0"/>
-              </a:spcBef>
-              <a:spcAft>
-                <a:spcPts val="0"/>
-              </a:spcAft>
-              <a:buClrTx/>
-              <a:buSzTx/>
-              <a:buFontTx/>
-              <a:buNone/>
-              <a:tabLst/>
-              <a:defRPr/>
-            </a:pPr>
             <a:r>
               <a:rPr lang="en-US" dirty="0"/>
-              <a:t>What other repositories are people using for their data?</a:t>
-            </a:r>
+              <a:t>To make these  notions more concrete – lets think back to  the discussion on climate change research we had several weeks ago. During that talk we were looking for examples of EHA’s climate related work or studies that could be expanded by looking a them through the lens of climate change. </a:t>
+            </a:r>
+          </a:p>
+          <a:p>
+            <a:endParaRPr lang="en-US" dirty="0"/>
           </a:p>
           <a:p>
             <a:endParaRPr lang="en-US" dirty="0"/>
@@ -7337,16 +7593,16 @@
           <a:p>
             <a:fld id="{465AF0FF-EACF-E44E-A814-689DA5D8CBF5}" type="slidenum">
               <a:rPr lang="en-US" smtClean="0"/>
-              <a:t>8</a:t>
+              <a:t>6</a:t>
             </a:fld>
-            <a:endParaRPr lang="en-US"/>
+            <a:endParaRPr lang="en-US" dirty="0"/>
           </a:p>
         </p:txBody>
       </p:sp>
     </p:spTree>
     <p:extLst>
       <p:ext uri="{BB962C8B-B14F-4D97-AF65-F5344CB8AC3E}">
-        <p14:creationId xmlns:p14="http://schemas.microsoft.com/office/powerpoint/2010/main" val="3609443217"/>
+        <p14:creationId xmlns:p14="http://schemas.microsoft.com/office/powerpoint/2010/main" val="3604445559"/>
       </p:ext>
     </p:extLst>
   </p:cSld>
@@ -7400,61 +7656,10 @@
           <a:bodyPr/>
           <a:lstStyle/>
           <a:p>
-            <a:pPr marL="457200" lvl="0" indent="-457200">
-              <a:buAutoNum type="arabicParenR"/>
-            </a:pPr>
             <a:r>
               <a:rPr lang="en-US" dirty="0"/>
-              <a:t>Long-term funding and planning, including a contingency plan for unforeseen circumstances.</a:t>
-            </a:r>
-          </a:p>
-          <a:p>
-            <a:pPr marL="457200" lvl="0" indent="-457200">
-              <a:buAutoNum type="arabicParenR"/>
-            </a:pPr>
-            <a:r>
-              <a:rPr lang="en-US" dirty="0"/>
-              <a:t>Unique persistent identifiers are assigned to research outputs.</a:t>
-            </a:r>
-          </a:p>
-          <a:p>
-            <a:pPr marL="457200" lvl="0" indent="-457200">
-              <a:buAutoNum type="arabicParenR"/>
-            </a:pPr>
-            <a:r>
-              <a:rPr lang="en-US" dirty="0"/>
-              <a:t>Metadata is required allowing researchers to discover outputs and to link outputs, people, and institutions.</a:t>
-            </a:r>
-          </a:p>
-          <a:p>
-            <a:pPr marL="457200" lvl="0" indent="-457200">
-              <a:buAutoNum type="arabicParenR"/>
-            </a:pPr>
-            <a:r>
-              <a:rPr lang="en-US" dirty="0"/>
-              <a:t>Access is free and unencumbered while respecting ethical and privacy concerns</a:t>
-            </a:r>
-          </a:p>
-          <a:p>
-            <a:pPr marL="457200" lvl="0" indent="-457200">
-              <a:buAutoNum type="arabicParenR"/>
-            </a:pPr>
-            <a:r>
-              <a:rPr lang="en-US" dirty="0"/>
-              <a:t>Security, integrity and confidentiality.</a:t>
-            </a:r>
-          </a:p>
-          <a:p>
-            <a:pPr marL="457200" lvl="0" indent="-457200">
-              <a:buAutoNum type="arabicParenR"/>
-            </a:pPr>
-            <a:r>
-              <a:rPr lang="en-US" dirty="0"/>
-              <a:t>Provenance for research outputs.</a:t>
-            </a:r>
-          </a:p>
-          <a:p>
-            <a:endParaRPr lang="en-US" dirty="0"/>
+              <a:t>Transition to talking about characteristics of repositories and requirements for deposited research outputs</a:t>
+            </a:r>
           </a:p>
         </p:txBody>
       </p:sp>
@@ -7475,16 +7680,16 @@
           <a:p>
             <a:fld id="{465AF0FF-EACF-E44E-A814-689DA5D8CBF5}" type="slidenum">
               <a:rPr lang="en-US" smtClean="0"/>
-              <a:t>9</a:t>
+              <a:t>7</a:t>
             </a:fld>
-            <a:endParaRPr lang="en-US"/>
+            <a:endParaRPr lang="en-US" dirty="0"/>
           </a:p>
         </p:txBody>
       </p:sp>
     </p:spTree>
     <p:extLst>
       <p:ext uri="{BB962C8B-B14F-4D97-AF65-F5344CB8AC3E}">
-        <p14:creationId xmlns:p14="http://schemas.microsoft.com/office/powerpoint/2010/main" val="1089371615"/>
+        <p14:creationId xmlns:p14="http://schemas.microsoft.com/office/powerpoint/2010/main" val="2845366223"/>
       </p:ext>
     </p:extLst>
   </p:cSld>
@@ -7538,6 +7743,29 @@
           <a:bodyPr/>
           <a:lstStyle/>
           <a:p>
+            <a:pPr marL="0" marR="0" lvl="0" indent="0" algn="l" defTabSz="914400" rtl="0" eaLnBrk="1" fontAlgn="auto" latinLnBrk="0" hangingPunct="1">
+              <a:lnSpc>
+                <a:spcPct val="100000"/>
+              </a:lnSpc>
+              <a:spcBef>
+                <a:spcPts val="0"/>
+              </a:spcBef>
+              <a:spcAft>
+                <a:spcPts val="0"/>
+              </a:spcAft>
+              <a:buClrTx/>
+              <a:buSzTx/>
+              <a:buFontTx/>
+              <a:buNone/>
+              <a:tabLst/>
+              <a:defRPr/>
+            </a:pPr>
+            <a:r>
+              <a:rPr lang="en-US" dirty="0"/>
+              <a:t>What other repositories are people using for their data?</a:t>
+            </a:r>
+          </a:p>
+          <a:p>
             <a:endParaRPr lang="en-US" dirty="0"/>
           </a:p>
         </p:txBody>
@@ -7559,16 +7787,16 @@
           <a:p>
             <a:fld id="{465AF0FF-EACF-E44E-A814-689DA5D8CBF5}" type="slidenum">
               <a:rPr lang="en-US" smtClean="0"/>
-              <a:t>10</a:t>
+              <a:t>8</a:t>
             </a:fld>
-            <a:endParaRPr lang="en-US"/>
+            <a:endParaRPr lang="en-US" dirty="0"/>
           </a:p>
         </p:txBody>
       </p:sp>
     </p:spTree>
     <p:extLst>
       <p:ext uri="{BB962C8B-B14F-4D97-AF65-F5344CB8AC3E}">
-        <p14:creationId xmlns:p14="http://schemas.microsoft.com/office/powerpoint/2010/main" val="805213592"/>
+        <p14:creationId xmlns:p14="http://schemas.microsoft.com/office/powerpoint/2010/main" val="3609443217"/>
       </p:ext>
     </p:extLst>
   </p:cSld>
@@ -7622,6 +7850,60 @@
           <a:bodyPr/>
           <a:lstStyle/>
           <a:p>
+            <a:pPr marL="457200" lvl="0" indent="-457200">
+              <a:buAutoNum type="arabicParenR"/>
+            </a:pPr>
+            <a:r>
+              <a:rPr lang="en-US" dirty="0"/>
+              <a:t>Long-term funding and planning, including a contingency plan for unforeseen circumstances.</a:t>
+            </a:r>
+          </a:p>
+          <a:p>
+            <a:pPr marL="457200" lvl="0" indent="-457200">
+              <a:buAutoNum type="arabicParenR"/>
+            </a:pPr>
+            <a:r>
+              <a:rPr lang="en-US" dirty="0"/>
+              <a:t>Unique persistent identifiers are assigned to research outputs.</a:t>
+            </a:r>
+          </a:p>
+          <a:p>
+            <a:pPr marL="457200" lvl="0" indent="-457200">
+              <a:buAutoNum type="arabicParenR"/>
+            </a:pPr>
+            <a:r>
+              <a:rPr lang="en-US" dirty="0"/>
+              <a:t>Metadata is required allowing researchers to discover outputs and to link outputs, people, and institutions.</a:t>
+            </a:r>
+          </a:p>
+          <a:p>
+            <a:pPr marL="457200" lvl="0" indent="-457200">
+              <a:buAutoNum type="arabicParenR"/>
+            </a:pPr>
+            <a:r>
+              <a:rPr lang="en-US" dirty="0"/>
+              <a:t>Access is free and unencumbered while respecting ethical and privacy concerns</a:t>
+            </a:r>
+          </a:p>
+          <a:p>
+            <a:pPr marL="457200" lvl="0" indent="-457200">
+              <a:buAutoNum type="arabicParenR"/>
+            </a:pPr>
+            <a:r>
+              <a:rPr lang="en-US" dirty="0"/>
+              <a:t>Security, integrity and confidentiality.</a:t>
+            </a:r>
+          </a:p>
+          <a:p>
+            <a:pPr marL="457200" lvl="0" indent="-457200">
+              <a:buAutoNum type="arabicParenR"/>
+            </a:pPr>
+            <a:r>
+              <a:rPr lang="en-US" dirty="0"/>
+              <a:t>Provenance for research outputs.</a:t>
+            </a:r>
+          </a:p>
+          <a:p>
             <a:endParaRPr lang="en-US" dirty="0"/>
           </a:p>
         </p:txBody>
@@ -7643,16 +7925,16 @@
           <a:p>
             <a:fld id="{465AF0FF-EACF-E44E-A814-689DA5D8CBF5}" type="slidenum">
               <a:rPr lang="en-US" smtClean="0"/>
-              <a:t>11</a:t>
+              <a:t>9</a:t>
             </a:fld>
-            <a:endParaRPr lang="en-US"/>
+            <a:endParaRPr lang="en-US" dirty="0"/>
           </a:p>
         </p:txBody>
       </p:sp>
     </p:spTree>
     <p:extLst>
       <p:ext uri="{BB962C8B-B14F-4D97-AF65-F5344CB8AC3E}">
-        <p14:creationId xmlns:p14="http://schemas.microsoft.com/office/powerpoint/2010/main" val="2553274909"/>
+        <p14:creationId xmlns:p14="http://schemas.microsoft.com/office/powerpoint/2010/main" val="1089371615"/>
       </p:ext>
     </p:extLst>
   </p:cSld>
@@ -7843,7 +8125,7 @@
               </a:pPr>
               <a:t>6/5/23</a:t>
             </a:fld>
-            <a:endParaRPr lang="en-US"/>
+            <a:endParaRPr lang="en-US" dirty="0"/>
           </a:p>
         </p:txBody>
       </p:sp>
@@ -7874,7 +8156,7 @@
             <a:pPr>
               <a:defRPr/>
             </a:pPr>
-            <a:endParaRPr lang="en-US"/>
+            <a:endParaRPr lang="en-US" dirty="0"/>
           </a:p>
         </p:txBody>
       </p:sp>
@@ -7912,7 +8194,7 @@
               </a:pPr>
               <a:t>‹#›</a:t>
             </a:fld>
-            <a:endParaRPr lang="en-US"/>
+            <a:endParaRPr lang="en-US" dirty="0"/>
           </a:p>
         </p:txBody>
       </p:sp>
@@ -8084,7 +8366,7 @@
               </a:pPr>
               <a:t>6/5/23</a:t>
             </a:fld>
-            <a:endParaRPr lang="en-US"/>
+            <a:endParaRPr lang="en-US" dirty="0"/>
           </a:p>
         </p:txBody>
       </p:sp>
@@ -8110,7 +8392,7 @@
             <a:pPr>
               <a:defRPr/>
             </a:pPr>
-            <a:endParaRPr lang="en-US"/>
+            <a:endParaRPr lang="en-US" dirty="0"/>
           </a:p>
         </p:txBody>
       </p:sp>
@@ -8143,7 +8425,7 @@
               </a:pPr>
               <a:t>‹#›</a:t>
             </a:fld>
-            <a:endParaRPr lang="en-US"/>
+            <a:endParaRPr lang="en-US" dirty="0"/>
           </a:p>
         </p:txBody>
       </p:sp>
@@ -8294,7 +8576,7 @@
               </a:pPr>
               <a:t>6/5/23</a:t>
             </a:fld>
-            <a:endParaRPr lang="en-US"/>
+            <a:endParaRPr lang="en-US" dirty="0"/>
           </a:p>
         </p:txBody>
       </p:sp>
@@ -8320,7 +8602,7 @@
             <a:pPr>
               <a:defRPr/>
             </a:pPr>
-            <a:endParaRPr lang="en-US"/>
+            <a:endParaRPr lang="en-US" dirty="0"/>
           </a:p>
         </p:txBody>
       </p:sp>
@@ -8353,7 +8635,7 @@
               </a:pPr>
               <a:t>‹#›</a:t>
             </a:fld>
-            <a:endParaRPr lang="en-US"/>
+            <a:endParaRPr lang="en-US" dirty="0"/>
           </a:p>
         </p:txBody>
       </p:sp>
@@ -8499,7 +8781,7 @@
               </a:pPr>
               <a:t>6/5/23</a:t>
             </a:fld>
-            <a:endParaRPr lang="en-US"/>
+            <a:endParaRPr lang="en-US" dirty="0"/>
           </a:p>
         </p:txBody>
       </p:sp>
@@ -8525,7 +8807,7 @@
             <a:pPr>
               <a:defRPr/>
             </a:pPr>
-            <a:endParaRPr lang="en-US"/>
+            <a:endParaRPr lang="en-US" dirty="0"/>
           </a:p>
         </p:txBody>
       </p:sp>
@@ -8558,7 +8840,7 @@
               </a:pPr>
               <a:t>‹#›</a:t>
             </a:fld>
-            <a:endParaRPr lang="en-US"/>
+            <a:endParaRPr lang="en-US" dirty="0"/>
           </a:p>
         </p:txBody>
       </p:sp>
@@ -8773,7 +9055,7 @@
               </a:pPr>
               <a:t>6/5/23</a:t>
             </a:fld>
-            <a:endParaRPr lang="en-US"/>
+            <a:endParaRPr lang="en-US" dirty="0"/>
           </a:p>
         </p:txBody>
       </p:sp>
@@ -8799,7 +9081,7 @@
             <a:pPr>
               <a:defRPr/>
             </a:pPr>
-            <a:endParaRPr lang="en-US"/>
+            <a:endParaRPr lang="en-US" dirty="0"/>
           </a:p>
         </p:txBody>
       </p:sp>
@@ -8832,7 +9114,7 @@
               </a:pPr>
               <a:t>‹#›</a:t>
             </a:fld>
-            <a:endParaRPr lang="en-US"/>
+            <a:endParaRPr lang="en-US" dirty="0"/>
           </a:p>
         </p:txBody>
       </p:sp>
@@ -9040,7 +9322,7 @@
               </a:pPr>
               <a:t>6/5/23</a:t>
             </a:fld>
-            <a:endParaRPr lang="en-US"/>
+            <a:endParaRPr lang="en-US" dirty="0"/>
           </a:p>
         </p:txBody>
       </p:sp>
@@ -9066,7 +9348,7 @@
             <a:pPr>
               <a:defRPr/>
             </a:pPr>
-            <a:endParaRPr lang="en-US"/>
+            <a:endParaRPr lang="en-US" dirty="0"/>
           </a:p>
         </p:txBody>
       </p:sp>
@@ -9099,7 +9381,7 @@
               </a:pPr>
               <a:t>‹#›</a:t>
             </a:fld>
-            <a:endParaRPr lang="en-US"/>
+            <a:endParaRPr lang="en-US" dirty="0"/>
           </a:p>
         </p:txBody>
       </p:sp>
@@ -9437,7 +9719,7 @@
               </a:pPr>
               <a:t>6/5/23</a:t>
             </a:fld>
-            <a:endParaRPr lang="en-US"/>
+            <a:endParaRPr lang="en-US" dirty="0"/>
           </a:p>
         </p:txBody>
       </p:sp>
@@ -9463,7 +9745,7 @@
             <a:pPr>
               <a:defRPr/>
             </a:pPr>
-            <a:endParaRPr lang="en-US"/>
+            <a:endParaRPr lang="en-US" dirty="0"/>
           </a:p>
         </p:txBody>
       </p:sp>
@@ -9496,7 +9778,7 @@
               </a:pPr>
               <a:t>‹#›</a:t>
             </a:fld>
-            <a:endParaRPr lang="en-US"/>
+            <a:endParaRPr lang="en-US" dirty="0"/>
           </a:p>
         </p:txBody>
       </p:sp>
@@ -9590,7 +9872,7 @@
               </a:pPr>
               <a:t>6/5/23</a:t>
             </a:fld>
-            <a:endParaRPr lang="en-US"/>
+            <a:endParaRPr lang="en-US" dirty="0"/>
           </a:p>
         </p:txBody>
       </p:sp>
@@ -9616,7 +9898,7 @@
             <a:pPr>
               <a:defRPr/>
             </a:pPr>
-            <a:endParaRPr lang="en-US"/>
+            <a:endParaRPr lang="en-US" dirty="0"/>
           </a:p>
         </p:txBody>
       </p:sp>
@@ -9649,7 +9931,7 @@
               </a:pPr>
               <a:t>‹#›</a:t>
             </a:fld>
-            <a:endParaRPr lang="en-US"/>
+            <a:endParaRPr lang="en-US" dirty="0"/>
           </a:p>
         </p:txBody>
       </p:sp>
@@ -9712,7 +9994,7 @@
               </a:pPr>
               <a:t>6/5/23</a:t>
             </a:fld>
-            <a:endParaRPr lang="en-US"/>
+            <a:endParaRPr lang="en-US" dirty="0"/>
           </a:p>
         </p:txBody>
       </p:sp>
@@ -9738,7 +10020,7 @@
             <a:pPr>
               <a:defRPr/>
             </a:pPr>
-            <a:endParaRPr lang="en-US"/>
+            <a:endParaRPr lang="en-US" dirty="0"/>
           </a:p>
         </p:txBody>
       </p:sp>
@@ -9771,7 +10053,7 @@
               </a:pPr>
               <a:t>‹#›</a:t>
             </a:fld>
-            <a:endParaRPr lang="en-US"/>
+            <a:endParaRPr lang="en-US" dirty="0"/>
           </a:p>
         </p:txBody>
       </p:sp>
@@ -10019,7 +10301,7 @@
               </a:pPr>
               <a:t>6/5/23</a:t>
             </a:fld>
-            <a:endParaRPr lang="en-US"/>
+            <a:endParaRPr lang="en-US" dirty="0"/>
           </a:p>
         </p:txBody>
       </p:sp>
@@ -10045,7 +10327,7 @@
             <a:pPr>
               <a:defRPr/>
             </a:pPr>
-            <a:endParaRPr lang="en-US"/>
+            <a:endParaRPr lang="en-US" dirty="0"/>
           </a:p>
         </p:txBody>
       </p:sp>
@@ -10078,7 +10360,7 @@
               </a:pPr>
               <a:t>‹#›</a:t>
             </a:fld>
-            <a:endParaRPr lang="en-US"/>
+            <a:endParaRPr lang="en-US" dirty="0"/>
           </a:p>
         </p:txBody>
       </p:sp>
@@ -10208,10 +10490,9 @@
           <a:p>
             <a:pPr lvl="0"/>
             <a:r>
-              <a:rPr lang="en-US" noProof="0"/>
+              <a:rPr lang="en-US" noProof="0" dirty="0"/>
               <a:t>Click icon to add picture</a:t>
             </a:r>
-            <a:endParaRPr lang="en-US" noProof="0" dirty="0"/>
           </a:p>
         </p:txBody>
       </p:sp>
@@ -10309,7 +10590,7 @@
               </a:pPr>
               <a:t>6/5/23</a:t>
             </a:fld>
-            <a:endParaRPr lang="en-US"/>
+            <a:endParaRPr lang="en-US" dirty="0"/>
           </a:p>
         </p:txBody>
       </p:sp>
@@ -10335,7 +10616,7 @@
             <a:pPr>
               <a:defRPr/>
             </a:pPr>
-            <a:endParaRPr lang="en-US"/>
+            <a:endParaRPr lang="en-US" dirty="0"/>
           </a:p>
         </p:txBody>
       </p:sp>
@@ -10368,7 +10649,7 @@
               </a:pPr>
               <a:t>‹#›</a:t>
             </a:fld>
-            <a:endParaRPr lang="en-US"/>
+            <a:endParaRPr lang="en-US" dirty="0"/>
           </a:p>
         </p:txBody>
       </p:sp>
@@ -11261,6 +11542,7 @@
               <a:buNone/>
             </a:pPr>
             <a:r>
+              <a:rPr dirty="0"/>
               <a:t>Building Blocks of Reproducibility</a:t>
             </a:r>
           </a:p>
@@ -11290,11 +11572,23 @@
               <a:buNone/>
             </a:pPr>
             <a:r>
-              <a:t>Long term research output storage</a:t>
-            </a:r>
-            <a:br/>
-            <a:br/>
-            <a:r>
+              <a:rPr lang="en-US" b="0" i="0" dirty="0">
+                <a:solidFill>
+                  <a:srgbClr val="3C4043"/>
+                </a:solidFill>
+                <a:effectLst/>
+                <a:latin typeface="Google Sans"/>
+              </a:rPr>
+              <a:t> Publishing Research Outputs in Scientific Repositories</a:t>
+            </a:r>
+            <a:br>
+              <a:rPr dirty="0"/>
+            </a:br>
+            <a:br>
+              <a:rPr dirty="0"/>
+            </a:br>
+            <a:r>
+              <a:rPr dirty="0"/>
               <a:t>Collin Schwantes</a:t>
             </a:r>
           </a:p>
@@ -11324,6 +11618,7 @@
               <a:buNone/>
             </a:pPr>
             <a:r>
+              <a:rPr dirty="0"/>
               <a:t>2023-06-05</a:t>
             </a:r>
           </a:p>
@@ -11381,6 +11676,7 @@
               <a:buNone/>
             </a:pPr>
             <a:r>
+              <a:rPr dirty="0"/>
               <a:t>Finding an appropriate repository</a:t>
             </a:r>
           </a:p>
@@ -11405,6 +11701,7 @@
               <a:buAutoNum type="arabicParenR"/>
             </a:pPr>
             <a:r>
+              <a:rPr dirty="0"/>
               <a:t>If your funder requires you to use a specific repository - use it</a:t>
             </a:r>
           </a:p>
@@ -11413,6 +11710,7 @@
               <a:buAutoNum type="arabicParenR"/>
             </a:pPr>
             <a:r>
+              <a:rPr dirty="0"/>
               <a:t>If people in your field always deposit the type of data your collecting in a particular repository - join the herd</a:t>
             </a:r>
           </a:p>
@@ -11421,6 +11719,7 @@
               <a:buAutoNum type="arabicParenR"/>
             </a:pPr>
             <a:r>
+              <a:rPr dirty="0"/>
               <a:t>If there is a repository that specializes in the type of data you collected and it meets your funder’s criteria or EHA’s criteria for a good repository? - go for it</a:t>
             </a:r>
           </a:p>
@@ -11429,6 +11728,7 @@
               <a:buAutoNum type="arabicParenR"/>
             </a:pPr>
             <a:r>
+              <a:rPr dirty="0"/>
               <a:t>Put your data in a generalist repository. They’ll take anything</a:t>
             </a:r>
           </a:p>
@@ -11437,19 +11737,21 @@
               <a:buNone/>
             </a:pPr>
             <a:r>
+              <a:rPr dirty="0"/>
               <a:t>Repository Catalogs: </a:t>
             </a:r>
             <a:r>
-              <a:rPr>
+              <a:rPr dirty="0">
                 <a:hlinkClick r:id="rId3"/>
               </a:rPr>
               <a:t>Re3data</a:t>
             </a:r>
             <a:r>
+              <a:rPr dirty="0"/>
               <a:t> </a:t>
             </a:r>
             <a:r>
-              <a:rPr>
+              <a:rPr dirty="0">
                 <a:hlinkClick r:id="rId4"/>
               </a:rPr>
               <a:t>FAIRSharing.org</a:t>
@@ -11531,7 +11833,7 @@
             <p:ph idx="1"/>
             <p:extLst>
               <p:ext uri="{D42A27DB-BD31-4B8C-83A1-F6EECF244321}">
-                <p14:modId xmlns:p14="http://schemas.microsoft.com/office/powerpoint/2010/main" val="2100140214"/>
+                <p14:modId xmlns:p14="http://schemas.microsoft.com/office/powerpoint/2010/main" val="271734203"/>
               </p:ext>
             </p:extLst>
           </p:nvPr>
@@ -11625,17 +11927,16 @@
           <a:bodyPr/>
           <a:lstStyle/>
           <a:p>
+            <a:r>
+              <a:rPr lang="en-US" dirty="0"/>
+              <a:t>Required for attribution</a:t>
+            </a:r>
+          </a:p>
+          <a:p>
             <a:pPr lvl="0"/>
             <a:r>
               <a:rPr lang="en-US" dirty="0"/>
               <a:t>Vital for creating findable research outputs</a:t>
-            </a:r>
-          </a:p>
-          <a:p>
-            <a:pPr lvl="0"/>
-            <a:r>
-              <a:rPr lang="en-US" dirty="0"/>
-              <a:t> Required for both generalist and specialist repositories</a:t>
             </a:r>
           </a:p>
           <a:p>
@@ -11844,8 +12145,10 @@
               <a:buNone/>
             </a:pPr>
             <a:r>
-              <a:t>Documentation</a:t>
-            </a:r>
+              <a:rPr lang="en-US" dirty="0"/>
+              <a:t>Structural Metadata and Documentation</a:t>
+            </a:r>
+            <a:endParaRPr dirty="0"/>
           </a:p>
         </p:txBody>
       </p:sp>
@@ -11867,8 +12170,8 @@
         </p:nvSpPr>
         <p:spPr>
           <a:xfrm>
-            <a:off x="838200" y="1825625"/>
-            <a:ext cx="9573126" cy="4351338"/>
+            <a:off x="822158" y="1822236"/>
+            <a:ext cx="5257800" cy="4351338"/>
           </a:xfrm>
         </p:spPr>
         <p:txBody>
@@ -11878,7 +12181,7 @@
             <a:pPr lvl="0"/>
             <a:r>
               <a:rPr lang="en-US" dirty="0"/>
-              <a:t>Critical for output reuse, but not the focus of this talk</a:t>
+              <a:t>Critical for output reuse</a:t>
             </a:r>
           </a:p>
           <a:p>
@@ -11890,6 +12193,145 @@
           </a:p>
         </p:txBody>
       </p:sp>
+      <p:grpSp>
+        <p:nvGrpSpPr>
+          <p:cNvPr id="6" name="Group 5">
+            <a:extLst>
+              <a:ext uri="{FF2B5EF4-FFF2-40B4-BE49-F238E27FC236}">
+                <a16:creationId xmlns:a16="http://schemas.microsoft.com/office/drawing/2014/main" id="{1029B1E8-67A6-6D06-8FB1-C86DFF999F6B}"/>
+              </a:ext>
+            </a:extLst>
+          </p:cNvPr>
+          <p:cNvGrpSpPr/>
+          <p:nvPr/>
+        </p:nvGrpSpPr>
+        <p:grpSpPr>
+          <a:xfrm>
+            <a:off x="6698463" y="1690690"/>
+            <a:ext cx="4482884" cy="4482884"/>
+            <a:chOff x="4998000" y="2331000"/>
+            <a:chExt cx="2196000" cy="2196000"/>
+          </a:xfrm>
+        </p:grpSpPr>
+        <p:sp>
+          <p:nvSpPr>
+            <p:cNvPr id="4" name="Oval 3">
+              <a:extLst>
+                <a:ext uri="{FF2B5EF4-FFF2-40B4-BE49-F238E27FC236}">
+                  <a16:creationId xmlns:a16="http://schemas.microsoft.com/office/drawing/2014/main" id="{1ED3B654-2BE0-9162-C769-1C129FAF6B02}"/>
+                </a:ext>
+              </a:extLst>
+            </p:cNvPr>
+            <p:cNvSpPr/>
+            <p:nvPr/>
+          </p:nvSpPr>
+          <p:spPr>
+            <a:xfrm>
+              <a:off x="4998000" y="2331000"/>
+              <a:ext cx="2196000" cy="2196000"/>
+            </a:xfrm>
+            <a:prstGeom prst="ellipse">
+              <a:avLst/>
+            </a:prstGeom>
+          </p:spPr>
+          <p:style>
+            <a:lnRef idx="0">
+              <a:schemeClr val="dk1">
+                <a:hueOff val="0"/>
+                <a:satOff val="0"/>
+                <a:lumOff val="0"/>
+                <a:alphaOff val="0"/>
+              </a:schemeClr>
+            </a:lnRef>
+            <a:fillRef idx="1">
+              <a:schemeClr val="accent1">
+                <a:tint val="40000"/>
+                <a:hueOff val="0"/>
+                <a:satOff val="0"/>
+                <a:lumOff val="0"/>
+                <a:alphaOff val="0"/>
+              </a:schemeClr>
+            </a:fillRef>
+            <a:effectRef idx="0">
+              <a:schemeClr val="accent1">
+                <a:tint val="40000"/>
+                <a:hueOff val="0"/>
+                <a:satOff val="0"/>
+                <a:lumOff val="0"/>
+                <a:alphaOff val="0"/>
+              </a:schemeClr>
+            </a:effectRef>
+            <a:fontRef idx="minor">
+              <a:schemeClr val="dk1">
+                <a:hueOff val="0"/>
+                <a:satOff val="0"/>
+                <a:lumOff val="0"/>
+                <a:alphaOff val="0"/>
+              </a:schemeClr>
+            </a:fontRef>
+          </p:style>
+        </p:sp>
+        <p:sp>
+          <p:nvSpPr>
+            <p:cNvPr id="5" name="Rectangle 4" descr="Building Brick Wall outline">
+              <a:extLst>
+                <a:ext uri="{FF2B5EF4-FFF2-40B4-BE49-F238E27FC236}">
+                  <a16:creationId xmlns:a16="http://schemas.microsoft.com/office/drawing/2014/main" id="{08995CD3-7D81-1A29-C560-940FD905E647}"/>
+                </a:ext>
+              </a:extLst>
+            </p:cNvPr>
+            <p:cNvSpPr/>
+            <p:nvPr/>
+          </p:nvSpPr>
+          <p:spPr>
+            <a:xfrm>
+              <a:off x="5466000" y="2799000"/>
+              <a:ext cx="1260000" cy="1260000"/>
+            </a:xfrm>
+            <a:prstGeom prst="rect">
+              <a:avLst/>
+            </a:prstGeom>
+            <a:blipFill>
+              <a:blip r:embed="rId3">
+                <a:extLst>
+                  <a:ext uri="{96DAC541-7B7A-43D3-8B79-37D633B846F1}">
+                    <asvg:svgBlip xmlns:asvg="http://schemas.microsoft.com/office/drawing/2016/SVG/main" r:embed="rId4"/>
+                  </a:ext>
+                </a:extLst>
+              </a:blip>
+              <a:srcRect/>
+              <a:stretch>
+                <a:fillRect/>
+              </a:stretch>
+            </a:blipFill>
+          </p:spPr>
+          <p:style>
+            <a:lnRef idx="2">
+              <a:schemeClr val="lt1">
+                <a:hueOff val="0"/>
+                <a:satOff val="0"/>
+                <a:lumOff val="0"/>
+                <a:alphaOff val="0"/>
+              </a:schemeClr>
+            </a:lnRef>
+            <a:fillRef idx="1">
+              <a:scrgbClr r="0" g="0" b="0"/>
+            </a:fillRef>
+            <a:effectRef idx="0">
+              <a:schemeClr val="accent1">
+                <a:shade val="80000"/>
+                <a:hueOff val="0"/>
+                <a:satOff val="0"/>
+                <a:lumOff val="0"/>
+                <a:alphaOff val="0"/>
+              </a:schemeClr>
+            </a:effectRef>
+            <a:fontRef idx="minor">
+              <a:schemeClr val="lt1"/>
+            </a:fontRef>
+          </p:style>
+        </p:sp>
+      </p:grpSp>
     </p:spTree>
   </p:cSld>
   <p:clrMapOvr>
@@ -12010,6 +12452,42 @@
           </a:p>
         </p:txBody>
       </p:sp>
+      <p:pic>
+        <p:nvPicPr>
+          <p:cNvPr id="5" name="Graphic 4" descr="Route (Two Pins With A Path) outline">
+            <a:extLst>
+              <a:ext uri="{FF2B5EF4-FFF2-40B4-BE49-F238E27FC236}">
+                <a16:creationId xmlns:a16="http://schemas.microsoft.com/office/drawing/2014/main" id="{C6C8C666-C9B7-4789-12AA-136A7248632F}"/>
+              </a:ext>
+            </a:extLst>
+          </p:cNvPr>
+          <p:cNvPicPr>
+            <a:picLocks noChangeAspect="1"/>
+          </p:cNvPicPr>
+          <p:nvPr/>
+        </p:nvPicPr>
+        <p:blipFill>
+          <a:blip r:embed="rId3">
+            <a:extLst>
+              <a:ext uri="{96DAC541-7B7A-43D3-8B79-37D633B846F1}">
+                <asvg:svgBlip xmlns:asvg="http://schemas.microsoft.com/office/drawing/2016/SVG/main" r:embed="rId4"/>
+              </a:ext>
+            </a:extLst>
+          </a:blip>
+          <a:stretch>
+            <a:fillRect/>
+          </a:stretch>
+        </p:blipFill>
+        <p:spPr>
+          <a:xfrm>
+            <a:off x="6879559" y="1381879"/>
+            <a:ext cx="4474241" cy="4474241"/>
+          </a:xfrm>
+          <a:prstGeom prst="rect">
+            <a:avLst/>
+          </a:prstGeom>
+        </p:spPr>
+      </p:pic>
     </p:spTree>
   </p:cSld>
   <p:clrMapOvr>
@@ -12079,7 +12557,12 @@
             <p:ph idx="1"/>
           </p:nvPr>
         </p:nvSpPr>
-        <p:spPr/>
+        <p:spPr>
+          <a:xfrm>
+            <a:off x="838200" y="1665205"/>
+            <a:ext cx="10515600" cy="4351338"/>
+          </a:xfrm>
+        </p:spPr>
         <p:txBody>
           <a:bodyPr/>
           <a:lstStyle/>
@@ -12411,7 +12894,7 @@
               <a:t>Projects create and update DMP describing intentions for data deposition (</a:t>
             </a:r>
             <a:r>
-              <a:rPr lang="en-US" dirty="0" err="1">
+              <a:rPr lang="en-US" dirty="0">
                 <a:hlinkClick r:id="rId3"/>
               </a:rPr>
               <a:t>dmptool.org</a:t>
@@ -12436,7 +12919,16 @@
             </a:pPr>
             <a:r>
               <a:rPr lang="en-US" dirty="0"/>
-              <a:t>PIDs for deposited items are scraped and added to the EHA Research outputs catalog </a:t>
+              <a:t>Reference deposited objects in workflows/other outputs</a:t>
+            </a:r>
+          </a:p>
+          <a:p>
+            <a:pPr marL="514350" lvl="0" indent="-514350">
+              <a:buAutoNum type="arabicParenR"/>
+            </a:pPr>
+            <a:r>
+              <a:rPr lang="en-US" dirty="0"/>
+              <a:t>Deposited items are collected and added to the EHA Research outputs catalog </a:t>
             </a:r>
           </a:p>
         </p:txBody>
@@ -12520,22 +13012,23 @@
           <a:bodyPr/>
           <a:lstStyle/>
           <a:p>
-            <a:pPr marL="0" lvl="0" indent="0">
-              <a:buNone/>
-            </a:pPr>
-            <a:r>
-              <a:rPr lang="en-US" dirty="0"/>
-              <a:t>- Upload an Item</a:t>
-            </a:r>
-          </a:p>
-          <a:p>
             <a:pPr lvl="0">
               <a:buFontTx/>
               <a:buChar char="-"/>
             </a:pPr>
             <a:r>
               <a:rPr lang="en-US" dirty="0"/>
-              <a:t>Add appropriate minimal metadata</a:t>
+              <a:t>Upload an Item</a:t>
+            </a:r>
+          </a:p>
+          <a:p>
+            <a:pPr>
+              <a:buFontTx/>
+              <a:buChar char="-"/>
+            </a:pPr>
+            <a:r>
+              <a:rPr lang="en-US" dirty="0"/>
+              <a:t>Add to community</a:t>
             </a:r>
           </a:p>
           <a:p>
@@ -12545,7 +13038,7 @@
             </a:pPr>
             <a:r>
               <a:rPr lang="en-US" dirty="0"/>
-              <a:t>Add to community</a:t>
+              <a:t>Add appropriate minimal metadata</a:t>
             </a:r>
           </a:p>
           <a:p>
@@ -12555,6 +13048,16 @@
             </a:pPr>
             <a:r>
               <a:rPr lang="en-US" dirty="0"/>
+              <a:t>Link to other research outputs</a:t>
+            </a:r>
+          </a:p>
+          <a:p>
+            <a:pPr lvl="0">
+              <a:buFontTx/>
+              <a:buChar char="-"/>
+            </a:pPr>
+            <a:r>
+              <a:rPr lang="en-US" dirty="0"/>
               <a:t>Update the item to show versioning</a:t>
             </a:r>
           </a:p>
@@ -12565,22 +13068,16 @@
             <a:endParaRPr lang="en-US" dirty="0"/>
           </a:p>
           <a:p>
-            <a:pPr lvl="0">
-              <a:buFontTx/>
-              <a:buChar char="-"/>
+            <a:pPr marL="0" lvl="0" indent="0">
+              <a:buNone/>
             </a:pPr>
             <a:r>
-              <a:rPr lang="en-US" dirty="0"/>
-              <a:t>https://</a:t>
-            </a:r>
-            <a:r>
-              <a:rPr lang="en-US" dirty="0" err="1"/>
-              <a:t>sandbox.zenodo.org</a:t>
-            </a:r>
-            <a:r>
-              <a:rPr lang="en-US" dirty="0"/>
-              <a:t>/</a:t>
-            </a:r>
+              <a:rPr lang="en-US" dirty="0">
+                <a:hlinkClick r:id="rId3"/>
+              </a:rPr>
+              <a:t>https://sandbox.zenodo.org/</a:t>
+            </a:r>
+            <a:endParaRPr lang="en-US" dirty="0"/>
           </a:p>
         </p:txBody>
       </p:sp>
@@ -12641,6 +13138,7 @@
               <a:buNone/>
             </a:pPr>
             <a:r>
+              <a:rPr dirty="0"/>
               <a:t>Deposits package overview</a:t>
             </a:r>
           </a:p>
@@ -12663,12 +13161,14 @@
           <a:p>
             <a:pPr lvl="0"/>
             <a:r>
+              <a:rPr dirty="0"/>
               <a:t>Tabular data</a:t>
             </a:r>
           </a:p>
           <a:p>
             <a:pPr lvl="0"/>
             <a:r>
+              <a:rPr dirty="0"/>
               <a:t>Non-tabular data</a:t>
             </a:r>
           </a:p>
@@ -12725,6 +13225,7 @@
               <a:buNone/>
             </a:pPr>
             <a:r>
+              <a:rPr dirty="0"/>
               <a:t>Research outputs are valuable</a:t>
             </a:r>
           </a:p>
@@ -12746,7 +13247,7 @@
             <p:ph idx="1"/>
             <p:extLst>
               <p:ext uri="{D42A27DB-BD31-4B8C-83A1-F6EECF244321}">
-                <p14:modId xmlns:p14="http://schemas.microsoft.com/office/powerpoint/2010/main" val="2729158416"/>
+                <p14:modId xmlns:p14="http://schemas.microsoft.com/office/powerpoint/2010/main" val="989352060"/>
               </p:ext>
             </p:extLst>
           </p:nvPr>
@@ -12938,27 +13439,7 @@
                 <a:effectLst/>
                 <a:latin typeface="Avenir" panose="02000503020000020003" pitchFamily="2" charset="0"/>
               </a:rPr>
-              <a:t>Vines, T. H. et al. </a:t>
-            </a:r>
-            <a:r>
-              <a:rPr lang="en-US" b="0" i="0" dirty="0" err="1">
-                <a:solidFill>
-                  <a:srgbClr val="000000"/>
-                </a:solidFill>
-                <a:effectLst/>
-                <a:latin typeface="Avenir" panose="02000503020000020003" pitchFamily="2" charset="0"/>
-              </a:rPr>
-              <a:t>Curr</a:t>
-            </a:r>
-            <a:r>
-              <a:rPr lang="en-US" b="0" i="0" dirty="0">
-                <a:solidFill>
-                  <a:srgbClr val="000000"/>
-                </a:solidFill>
-                <a:effectLst/>
-                <a:latin typeface="Avenir" panose="02000503020000020003" pitchFamily="2" charset="0"/>
-              </a:rPr>
-              <a:t>. Biol. </a:t>
+              <a:t>Vines, T. H. et al. Curr. Biol. </a:t>
             </a:r>
             <a:r>
               <a:rPr lang="en-US" b="0" i="0" u="none" strike="noStrike" dirty="0">
@@ -13073,62 +13554,31 @@
         </p:nvSpPr>
         <p:spPr>
           <a:xfrm>
-            <a:off x="839788" y="457200"/>
-            <a:ext cx="9346949" cy="858253"/>
+            <a:off x="838200" y="365127"/>
+            <a:ext cx="10515600" cy="1325563"/>
           </a:xfrm>
+          <a:prstGeom prst="rect">
+            <a:avLst/>
+          </a:prstGeom>
         </p:spPr>
         <p:txBody>
-          <a:bodyPr wrap="square" anchor="b">
-            <a:normAutofit/>
-          </a:bodyPr>
+          <a:bodyPr/>
           <a:lstStyle/>
           <a:p>
             <a:pPr marL="0" lvl="0" indent="0">
               <a:buNone/>
             </a:pPr>
             <a:r>
+              <a:rPr lang="en-US" dirty="0"/>
+              <a:t>Scientific </a:t>
+            </a:r>
+            <a:r>
               <a:rPr dirty="0"/>
-              <a:t>Thought exercise: Climate Change Brainstorm</a:t>
+              <a:t>Repositories</a:t>
             </a:r>
           </a:p>
         </p:txBody>
       </p:sp>
-      <p:pic>
-        <p:nvPicPr>
-          <p:cNvPr id="5" name="Picture Placeholder 4" descr="Group brainstorm outline">
-            <a:extLst>
-              <a:ext uri="{FF2B5EF4-FFF2-40B4-BE49-F238E27FC236}">
-                <a16:creationId xmlns:a16="http://schemas.microsoft.com/office/drawing/2014/main" id="{F79366F9-9EA4-A45C-6957-2D1093E84BFA}"/>
-              </a:ext>
-            </a:extLst>
-          </p:cNvPr>
-          <p:cNvPicPr>
-            <a:picLocks noGrp="1" noChangeAspect="1"/>
-          </p:cNvPicPr>
-          <p:nvPr>
-            <p:ph type="pic" idx="1"/>
-          </p:nvPr>
-        </p:nvPicPr>
-        <p:blipFill>
-          <a:blip r:embed="rId3">
-            <a:extLst>
-              <a:ext uri="{96DAC541-7B7A-43D3-8B79-37D633B846F1}">
-                <asvg:svgBlip xmlns:asvg="http://schemas.microsoft.com/office/drawing/2016/SVG/main" r:embed="rId4"/>
-              </a:ext>
-            </a:extLst>
-          </a:blip>
-          <a:srcRect t="10520" b="10520"/>
-          <a:stretch>
-            <a:fillRect/>
-          </a:stretch>
-        </p:blipFill>
-        <p:spPr>
-          <a:xfrm>
-            <a:off x="6898874" y="2342147"/>
-            <a:ext cx="4456513" cy="3518903"/>
-          </a:xfrm>
-        </p:spPr>
-      </p:pic>
       <p:sp>
         <p:nvSpPr>
           <p:cNvPr id="3" name="Content Placeholder 2"/>
@@ -13136,53 +13586,32 @@
             <a:spLocks noGrp="1"/>
           </p:cNvSpPr>
           <p:nvPr>
-            <p:ph type="body" sz="half" idx="2"/>
-          </p:nvPr>
-        </p:nvSpPr>
-        <p:spPr>
-          <a:xfrm>
-            <a:off x="836613" y="1736558"/>
-            <a:ext cx="5721433" cy="3811588"/>
-          </a:xfrm>
-        </p:spPr>
+            <p:ph idx="1"/>
+          </p:nvPr>
+        </p:nvSpPr>
+        <p:spPr/>
         <p:txBody>
-          <a:bodyPr wrap="square" anchor="t">
-            <a:normAutofit/>
-          </a:bodyPr>
+          <a:bodyPr/>
           <a:lstStyle/>
           <a:p>
             <a:pPr lvl="0"/>
             <a:r>
-              <a:rPr sz="2400" dirty="0"/>
-              <a:t>Several weeks </a:t>
-            </a:r>
-            <a:r>
-              <a:rPr lang="en-US" sz="2400" dirty="0"/>
-              <a:t>ago,</a:t>
-            </a:r>
-            <a:r>
-              <a:rPr sz="2400" dirty="0"/>
-              <a:t> we had a discussion of research questions EHA could answer or has answered relating to climate change. </a:t>
-            </a:r>
-            <a:endParaRPr lang="en-US" sz="2400" dirty="0"/>
+              <a:rPr dirty="0"/>
+              <a:t>Structured long-term file storage services that provide access research outputs</a:t>
+            </a:r>
           </a:p>
           <a:p>
             <a:pPr lvl="0"/>
-            <a:endParaRPr lang="en-US" sz="2400" dirty="0"/>
+            <a:r>
+              <a:rPr dirty="0"/>
+              <a:t>Most can generate persistent identifiers (PIDs)</a:t>
+            </a:r>
           </a:p>
           <a:p>
             <a:pPr lvl="0"/>
             <a:r>
-              <a:rPr sz="2400" dirty="0"/>
-              <a:t>How might that discussion have gone differently if we had a catalog of </a:t>
-            </a:r>
-            <a:r>
-              <a:rPr lang="en-US" sz="2400" dirty="0"/>
-              <a:t>deposited </a:t>
-            </a:r>
-            <a:r>
-              <a:rPr sz="2400" dirty="0"/>
-              <a:t>research outputs?</a:t>
+              <a:rPr dirty="0"/>
+              <a:t>Most allow you to link research outputs, people, and institutions through metadata.</a:t>
             </a:r>
           </a:p>
         </p:txBody>
@@ -13239,8 +13668,14 @@
               <a:buNone/>
             </a:pPr>
             <a:r>
-              <a:t>Benefits of long term research output deposition</a:t>
-            </a:r>
+              <a:rPr dirty="0"/>
+              <a:t>Benefits of</a:t>
+            </a:r>
+            <a:r>
+              <a:rPr lang="en-US" dirty="0"/>
+              <a:t> depositing outputs</a:t>
+            </a:r>
+            <a:endParaRPr dirty="0"/>
           </a:p>
         </p:txBody>
       </p:sp>
@@ -13261,43 +13696,37 @@
           <a:p>
             <a:pPr lvl="0"/>
             <a:r>
-              <a:t>Your outputs will be stored in a safe location</a:t>
+              <a:rPr dirty="0"/>
+              <a:t>Your outputs will be stored in a safe </a:t>
+            </a:r>
+            <a:r>
+              <a:rPr lang="en-US" dirty="0"/>
+              <a:t>and accessible </a:t>
+            </a:r>
+            <a:r>
+              <a:rPr dirty="0"/>
+              <a:t>location</a:t>
             </a:r>
           </a:p>
           <a:p>
             <a:pPr lvl="0"/>
             <a:r>
-              <a:t>Your outputs will be readily accessible</a:t>
+              <a:rPr lang="en-US" dirty="0"/>
+              <a:t>Your outputs will be cataloged and discoverable in searches</a:t>
             </a:r>
           </a:p>
           <a:p>
             <a:pPr lvl="0"/>
             <a:r>
+              <a:rPr dirty="0"/>
               <a:t>Your outputs will have a persistent identifier (PID) that can be cited</a:t>
             </a:r>
           </a:p>
           <a:p>
             <a:pPr lvl="0"/>
             <a:r>
-              <a:t>Your outputs will be cataloged and discoverable in searches</a:t>
-            </a:r>
-          </a:p>
-          <a:p>
-            <a:pPr lvl="0"/>
-            <a:r>
+              <a:rPr dirty="0"/>
               <a:t>Your research will be more FAIR</a:t>
-            </a:r>
-          </a:p>
-          <a:p>
-            <a:pPr lvl="0"/>
-            <a:r>
-              <a:t>You will likely be complying with funding requirements</a:t>
-            </a:r>
-          </a:p>
-          <a:p>
-            <a:pPr lvl="0"/>
-            <a:r>
-              <a:t>Easier for you to reuse work to get funding</a:t>
             </a:r>
           </a:p>
         </p:txBody>
@@ -13339,26 +13768,62 @@
         </p:nvSpPr>
         <p:spPr>
           <a:xfrm>
-            <a:off x="838200" y="365127"/>
-            <a:ext cx="10515600" cy="1325563"/>
+            <a:off x="839788" y="457200"/>
+            <a:ext cx="9346949" cy="858253"/>
           </a:xfrm>
-          <a:prstGeom prst="rect">
-            <a:avLst/>
-          </a:prstGeom>
         </p:spPr>
         <p:txBody>
-          <a:bodyPr/>
+          <a:bodyPr wrap="square" anchor="b">
+            <a:normAutofit/>
+          </a:bodyPr>
           <a:lstStyle/>
           <a:p>
             <a:pPr marL="0" lvl="0" indent="0">
               <a:buNone/>
             </a:pPr>
             <a:r>
-              <a:t>Repositories</a:t>
+              <a:rPr dirty="0"/>
+              <a:t>Thought exercise: Climate Change Brainstorm</a:t>
             </a:r>
           </a:p>
         </p:txBody>
       </p:sp>
+      <p:pic>
+        <p:nvPicPr>
+          <p:cNvPr id="5" name="Picture Placeholder 4" descr="Group brainstorm outline">
+            <a:extLst>
+              <a:ext uri="{FF2B5EF4-FFF2-40B4-BE49-F238E27FC236}">
+                <a16:creationId xmlns:a16="http://schemas.microsoft.com/office/drawing/2014/main" id="{F79366F9-9EA4-A45C-6957-2D1093E84BFA}"/>
+              </a:ext>
+            </a:extLst>
+          </p:cNvPr>
+          <p:cNvPicPr>
+            <a:picLocks noGrp="1" noChangeAspect="1"/>
+          </p:cNvPicPr>
+          <p:nvPr>
+            <p:ph type="pic" idx="1"/>
+          </p:nvPr>
+        </p:nvPicPr>
+        <p:blipFill>
+          <a:blip r:embed="rId3">
+            <a:extLst>
+              <a:ext uri="{96DAC541-7B7A-43D3-8B79-37D633B846F1}">
+                <asvg:svgBlip xmlns:asvg="http://schemas.microsoft.com/office/drawing/2016/SVG/main" r:embed="rId4"/>
+              </a:ext>
+            </a:extLst>
+          </a:blip>
+          <a:srcRect t="10520" b="10520"/>
+          <a:stretch>
+            <a:fillRect/>
+          </a:stretch>
+        </p:blipFill>
+        <p:spPr>
+          <a:xfrm>
+            <a:off x="6898874" y="2342147"/>
+            <a:ext cx="4456513" cy="3518903"/>
+          </a:xfrm>
+        </p:spPr>
+      </p:pic>
       <p:sp>
         <p:nvSpPr>
           <p:cNvPr id="3" name="Content Placeholder 2"/>
@@ -13366,29 +13831,53 @@
             <a:spLocks noGrp="1"/>
           </p:cNvSpPr>
           <p:nvPr>
-            <p:ph idx="1"/>
-          </p:nvPr>
-        </p:nvSpPr>
-        <p:spPr/>
+            <p:ph type="body" sz="half" idx="2"/>
+          </p:nvPr>
+        </p:nvSpPr>
+        <p:spPr>
+          <a:xfrm>
+            <a:off x="836613" y="1736558"/>
+            <a:ext cx="5721433" cy="3811588"/>
+          </a:xfrm>
+        </p:spPr>
         <p:txBody>
-          <a:bodyPr/>
+          <a:bodyPr wrap="square" anchor="t">
+            <a:normAutofit/>
+          </a:bodyPr>
           <a:lstStyle/>
           <a:p>
             <a:pPr lvl="0"/>
             <a:r>
-              <a:t>Structured long-term file storage services that provide access research outputs</a:t>
-            </a:r>
+              <a:rPr sz="2400" dirty="0"/>
+              <a:t>Several weeks </a:t>
+            </a:r>
+            <a:r>
+              <a:rPr lang="en-US" sz="2400" dirty="0"/>
+              <a:t>ago,</a:t>
+            </a:r>
+            <a:r>
+              <a:rPr sz="2400" dirty="0"/>
+              <a:t> we had a discussion of research questions EHA could answer or has answered relating to climate change. </a:t>
+            </a:r>
+            <a:endParaRPr lang="en-US" sz="2400" dirty="0"/>
           </a:p>
           <a:p>
             <a:pPr lvl="0"/>
-            <a:r>
-              <a:t>Most can generate persistent identifiers (PIDs)</a:t>
-            </a:r>
+            <a:endParaRPr lang="en-US" sz="2400" dirty="0"/>
           </a:p>
           <a:p>
             <a:pPr lvl="0"/>
             <a:r>
-              <a:t>Most allow you to link research outputs, people, and institutions through metadata.</a:t>
+              <a:rPr sz="2400" dirty="0"/>
+              <a:t>How might that discussion have gone differently if we had a catalog of </a:t>
+            </a:r>
+            <a:r>
+              <a:rPr lang="en-US" sz="2400" dirty="0"/>
+              <a:t>deposited </a:t>
+            </a:r>
+            <a:r>
+              <a:rPr sz="2400" dirty="0"/>
+              <a:t>research outputs?</a:t>
             </a:r>
           </a:p>
         </p:txBody>
@@ -13445,6 +13934,7 @@
               <a:buNone/>
             </a:pPr>
             <a:r>
+              <a:rPr dirty="0"/>
               <a:t>Generalists vs specialist Repositories</a:t>
             </a:r>
           </a:p>
@@ -13554,6 +14044,7 @@
               <a:buNone/>
             </a:pPr>
             <a:r>
+              <a:rPr dirty="0"/>
               <a:t>Repositories commonly used by EHA</a:t>
             </a:r>
           </a:p>
@@ -13705,13 +14196,8 @@
                     <a:p>
                       <a:r>
                         <a:rPr lang="en-US" dirty="0"/>
-                        <a:t>Accepts any file less than 50 </a:t>
+                        <a:t>Accepts any file less than 50 gb</a:t>
                       </a:r>
-                      <a:r>
-                        <a:rPr lang="en-US" dirty="0" err="1"/>
-                        <a:t>gb</a:t>
-                      </a:r>
-                      <a:endParaRPr lang="en-US" dirty="0"/>
                     </a:p>
                   </a:txBody>
                   <a:tcPr/>
@@ -13975,13 +14461,8 @@
                       </a:pPr>
                       <a:r>
                         <a:rPr lang="en-US" dirty="0"/>
-                        <a:t>Accepts any file less than 20 </a:t>
+                        <a:t>Accepts any file less than 20 gb</a:t>
                       </a:r>
-                      <a:r>
-                        <a:rPr lang="en-US" dirty="0" err="1"/>
-                        <a:t>gb</a:t>
-                      </a:r>
-                      <a:endParaRPr lang="en-US" dirty="0"/>
                     </a:p>
                     <a:p>
                       <a:endParaRPr lang="en-US" dirty="0"/>
@@ -14051,6 +14532,7 @@
               <a:buNone/>
             </a:pPr>
             <a:r>
+              <a:rPr dirty="0"/>
               <a:t>What qualifies as a good repository?</a:t>
             </a:r>
           </a:p>
@@ -14090,7 +14572,7 @@
             </a:pPr>
             <a:r>
               <a:rPr dirty="0"/>
-              <a:t>Unique persistent identifiers are assigned to research outputs.</a:t>
+              <a:t>Unique persistent identifiers are assigned to research outputs</a:t>
             </a:r>
           </a:p>
           <a:p>
@@ -14127,7 +14609,7 @@
             </a:pPr>
             <a:r>
               <a:rPr dirty="0"/>
-              <a:t>Provenance for research outputs.</a:t>
+              <a:t>Provenance for research outputs</a:t>
             </a:r>
           </a:p>
         </p:txBody>

</xml_diff>